<commit_message>
documentation and presentation added
</commit_message>
<xml_diff>
--- a/JobOffersRankingAHP.pptx
+++ b/JobOffersRankingAHP.pptx
@@ -7,10 +7,8 @@
   <p:sldIdLst>
     <p:sldId id="256" r:id="rId2"/>
     <p:sldId id="257" r:id="rId3"/>
-    <p:sldId id="258" r:id="rId4"/>
-    <p:sldId id="259" r:id="rId5"/>
-    <p:sldId id="260" r:id="rId6"/>
-    <p:sldId id="261" r:id="rId7"/>
+    <p:sldId id="259" r:id="rId4"/>
+    <p:sldId id="261" r:id="rId5"/>
   </p:sldIdLst>
   <p:sldSz cx="12192000" cy="6858000"/>
   <p:notesSz cx="6858000" cy="9144000"/>
@@ -109,6 +107,11 @@
       </a:defRPr>
     </a:lvl9pPr>
   </p:defaultTextStyle>
+  <p:extLst>
+    <p:ext uri="{EFAFB233-063F-42B5-8137-9DF3F51BA10A}">
+      <p15:sldGuideLst xmlns:p15="http://schemas.microsoft.com/office/powerpoint/2012/main"/>
+    </p:ext>
+  </p:extLst>
 </p:presentation>
 </file>
 
@@ -298,7 +301,7 @@
           <a:p>
             <a:fld id="{139A0F32-E699-4C24-9FA9-D020BDB52F29}" type="datetimeFigureOut">
               <a:rPr lang="pl-PL" smtClean="0"/>
-              <a:t>31.12.2022</a:t>
+              <a:t>05.02.2023</a:t>
             </a:fld>
             <a:endParaRPr lang="pl-PL"/>
           </a:p>
@@ -573,7 +576,7 @@
           <a:p>
             <a:fld id="{139A0F32-E699-4C24-9FA9-D020BDB52F29}" type="datetimeFigureOut">
               <a:rPr lang="pl-PL" smtClean="0"/>
-              <a:t>31.12.2022</a:t>
+              <a:t>05.02.2023</a:t>
             </a:fld>
             <a:endParaRPr lang="pl-PL"/>
           </a:p>
@@ -767,7 +770,7 @@
           <a:p>
             <a:fld id="{139A0F32-E699-4C24-9FA9-D020BDB52F29}" type="datetimeFigureOut">
               <a:rPr lang="pl-PL" smtClean="0"/>
-              <a:t>31.12.2022</a:t>
+              <a:t>05.02.2023</a:t>
             </a:fld>
             <a:endParaRPr lang="pl-PL"/>
           </a:p>
@@ -1040,7 +1043,7 @@
           <a:p>
             <a:fld id="{139A0F32-E699-4C24-9FA9-D020BDB52F29}" type="datetimeFigureOut">
               <a:rPr lang="pl-PL" smtClean="0"/>
-              <a:t>31.12.2022</a:t>
+              <a:t>05.02.2023</a:t>
             </a:fld>
             <a:endParaRPr lang="pl-PL"/>
           </a:p>
@@ -1381,7 +1384,7 @@
           <a:p>
             <a:fld id="{139A0F32-E699-4C24-9FA9-D020BDB52F29}" type="datetimeFigureOut">
               <a:rPr lang="pl-PL" smtClean="0"/>
-              <a:t>31.12.2022</a:t>
+              <a:t>05.02.2023</a:t>
             </a:fld>
             <a:endParaRPr lang="pl-PL"/>
           </a:p>
@@ -2004,7 +2007,7 @@
           <a:p>
             <a:fld id="{139A0F32-E699-4C24-9FA9-D020BDB52F29}" type="datetimeFigureOut">
               <a:rPr lang="pl-PL" smtClean="0"/>
-              <a:t>31.12.2022</a:t>
+              <a:t>05.02.2023</a:t>
             </a:fld>
             <a:endParaRPr lang="pl-PL"/>
           </a:p>
@@ -2864,7 +2867,7 @@
           <a:p>
             <a:fld id="{139A0F32-E699-4C24-9FA9-D020BDB52F29}" type="datetimeFigureOut">
               <a:rPr lang="pl-PL" smtClean="0"/>
-              <a:t>31.12.2022</a:t>
+              <a:t>05.02.2023</a:t>
             </a:fld>
             <a:endParaRPr lang="pl-PL"/>
           </a:p>
@@ -3034,7 +3037,7 @@
           <a:p>
             <a:fld id="{139A0F32-E699-4C24-9FA9-D020BDB52F29}" type="datetimeFigureOut">
               <a:rPr lang="pl-PL" smtClean="0"/>
-              <a:t>31.12.2022</a:t>
+              <a:t>05.02.2023</a:t>
             </a:fld>
             <a:endParaRPr lang="pl-PL"/>
           </a:p>
@@ -3214,7 +3217,7 @@
           <a:p>
             <a:fld id="{139A0F32-E699-4C24-9FA9-D020BDB52F29}" type="datetimeFigureOut">
               <a:rPr lang="pl-PL" smtClean="0"/>
-              <a:t>31.12.2022</a:t>
+              <a:t>05.02.2023</a:t>
             </a:fld>
             <a:endParaRPr lang="pl-PL"/>
           </a:p>
@@ -3384,7 +3387,7 @@
           <a:p>
             <a:fld id="{139A0F32-E699-4C24-9FA9-D020BDB52F29}" type="datetimeFigureOut">
               <a:rPr lang="pl-PL" smtClean="0"/>
-              <a:t>31.12.2022</a:t>
+              <a:t>05.02.2023</a:t>
             </a:fld>
             <a:endParaRPr lang="pl-PL"/>
           </a:p>
@@ -3631,7 +3634,7 @@
           <a:p>
             <a:fld id="{139A0F32-E699-4C24-9FA9-D020BDB52F29}" type="datetimeFigureOut">
               <a:rPr lang="pl-PL" smtClean="0"/>
-              <a:t>31.12.2022</a:t>
+              <a:t>05.02.2023</a:t>
             </a:fld>
             <a:endParaRPr lang="pl-PL"/>
           </a:p>
@@ -3923,7 +3926,7 @@
           <a:p>
             <a:fld id="{139A0F32-E699-4C24-9FA9-D020BDB52F29}" type="datetimeFigureOut">
               <a:rPr lang="pl-PL" smtClean="0"/>
-              <a:t>31.12.2022</a:t>
+              <a:t>05.02.2023</a:t>
             </a:fld>
             <a:endParaRPr lang="pl-PL"/>
           </a:p>
@@ -4367,7 +4370,7 @@
           <a:p>
             <a:fld id="{139A0F32-E699-4C24-9FA9-D020BDB52F29}" type="datetimeFigureOut">
               <a:rPr lang="pl-PL" smtClean="0"/>
-              <a:t>31.12.2022</a:t>
+              <a:t>05.02.2023</a:t>
             </a:fld>
             <a:endParaRPr lang="pl-PL"/>
           </a:p>
@@ -4485,7 +4488,7 @@
           <a:p>
             <a:fld id="{139A0F32-E699-4C24-9FA9-D020BDB52F29}" type="datetimeFigureOut">
               <a:rPr lang="pl-PL" smtClean="0"/>
-              <a:t>31.12.2022</a:t>
+              <a:t>05.02.2023</a:t>
             </a:fld>
             <a:endParaRPr lang="pl-PL"/>
           </a:p>
@@ -4580,7 +4583,7 @@
           <a:p>
             <a:fld id="{139A0F32-E699-4C24-9FA9-D020BDB52F29}" type="datetimeFigureOut">
               <a:rPr lang="pl-PL" smtClean="0"/>
-              <a:t>31.12.2022</a:t>
+              <a:t>05.02.2023</a:t>
             </a:fld>
             <a:endParaRPr lang="pl-PL"/>
           </a:p>
@@ -4859,7 +4862,7 @@
           <a:p>
             <a:fld id="{139A0F32-E699-4C24-9FA9-D020BDB52F29}" type="datetimeFigureOut">
               <a:rPr lang="pl-PL" smtClean="0"/>
-              <a:t>31.12.2022</a:t>
+              <a:t>05.02.2023</a:t>
             </a:fld>
             <a:endParaRPr lang="pl-PL"/>
           </a:p>
@@ -5134,7 +5137,7 @@
           <a:p>
             <a:fld id="{139A0F32-E699-4C24-9FA9-D020BDB52F29}" type="datetimeFigureOut">
               <a:rPr lang="pl-PL" smtClean="0"/>
-              <a:t>31.12.2022</a:t>
+              <a:t>05.02.2023</a:t>
             </a:fld>
             <a:endParaRPr lang="pl-PL"/>
           </a:p>
@@ -5563,7 +5566,7 @@
           <a:p>
             <a:fld id="{139A0F32-E699-4C24-9FA9-D020BDB52F29}" type="datetimeFigureOut">
               <a:rPr lang="pl-PL" smtClean="0"/>
-              <a:t>31.12.2022</a:t>
+              <a:t>05.02.2023</a:t>
             </a:fld>
             <a:endParaRPr lang="pl-PL"/>
           </a:p>
@@ -6112,9 +6115,10 @@
           <a:bodyPr/>
           <a:lstStyle/>
           <a:p>
-            <a:r>
-              <a:rPr lang="pl-PL" dirty="0"/>
-              <a:t>Prezentacja działania projektu wyboru oferty pracy</a:t>
+            <a:pPr algn="ctr"/>
+            <a:r>
+              <a:rPr lang="pl-PL" sz="6000" dirty="0"/>
+              <a:t>Prezentacja rozszerzeń do projektu wyboru oferty pracy</a:t>
             </a:r>
           </a:p>
         </p:txBody>
@@ -6133,8 +6137,8 @@
         </p:nvSpPr>
         <p:spPr>
           <a:xfrm>
-            <a:off x="9771355" y="5921406"/>
-            <a:ext cx="1793289" cy="646331"/>
+            <a:off x="9319099" y="5921406"/>
+            <a:ext cx="2245546" cy="646331"/>
           </a:xfrm>
           <a:prstGeom prst="rect">
             <a:avLst/>
@@ -6211,46 +6215,74 @@
             <p:ph type="title"/>
           </p:nvPr>
         </p:nvSpPr>
-        <p:spPr/>
+        <p:spPr>
+          <a:xfrm>
+            <a:off x="646111" y="452718"/>
+            <a:ext cx="9976493" cy="1400530"/>
+          </a:xfrm>
+        </p:spPr>
         <p:txBody>
           <a:bodyPr/>
           <a:lstStyle/>
           <a:p>
+            <a:pPr algn="r"/>
             <a:r>
               <a:rPr lang="pl-PL" dirty="0"/>
-              <a:t>Ekran dodawania ofert</a:t>
-            </a:r>
+              <a:t>Ekran dodawania ofert – </a:t>
+            </a:r>
+            <a:r>
+              <a:rPr lang="pl-PL" sz="1800" dirty="0"/>
+              <a:t>dodane jest tu wpisywanie     ekspertów oraz kategorii</a:t>
+            </a:r>
+            <a:endParaRPr lang="pl-PL" dirty="0"/>
           </a:p>
         </p:txBody>
       </p:sp>
       <p:pic>
         <p:nvPicPr>
-          <p:cNvPr id="5" name="Obraz 4">
+          <p:cNvPr id="1026" name="Picture 2">
             <a:extLst>
               <a:ext uri="{FF2B5EF4-FFF2-40B4-BE49-F238E27FC236}">
-                <a16:creationId xmlns:a16="http://schemas.microsoft.com/office/drawing/2014/main" id="{AB4966C6-D163-DBE2-502B-1FF10B7575C4}"/>
+                <a16:creationId xmlns:a16="http://schemas.microsoft.com/office/drawing/2014/main" id="{38F53AB0-9B06-9E3F-3F87-9CC7F0324705}"/>
               </a:ext>
             </a:extLst>
           </p:cNvPr>
           <p:cNvPicPr>
-            <a:picLocks noChangeAspect="1"/>
+            <a:picLocks noChangeAspect="1" noChangeArrowheads="1"/>
           </p:cNvPicPr>
           <p:nvPr/>
         </p:nvPicPr>
         <p:blipFill>
-          <a:blip r:embed="rId2"/>
+          <a:blip r:embed="rId2">
+            <a:extLst>
+              <a:ext uri="{28A0092B-C50C-407E-A947-70E740481C1C}">
+                <a14:useLocalDpi xmlns:a14="http://schemas.microsoft.com/office/drawing/2010/main" val="0"/>
+              </a:ext>
+            </a:extLst>
+          </a:blip>
+          <a:srcRect/>
           <a:stretch>
             <a:fillRect/>
           </a:stretch>
         </p:blipFill>
-        <p:spPr>
+        <p:spPr bwMode="auto">
           <a:xfrm>
-            <a:off x="2766548" y="1539768"/>
-            <a:ext cx="6658904" cy="4982270"/>
+            <a:off x="3564275" y="1993056"/>
+            <a:ext cx="5063449" cy="3832173"/>
           </a:xfrm>
           <a:prstGeom prst="rect">
             <a:avLst/>
           </a:prstGeom>
+          <a:noFill/>
+          <a:extLst>
+            <a:ext uri="{909E8E84-426E-40DD-AFC4-6F175D3DCCD1}">
+              <a14:hiddenFill xmlns:a14="http://schemas.microsoft.com/office/drawing/2010/main">
+                <a:solidFill>
+                  <a:srgbClr val="FFFFFF"/>
+                </a:solidFill>
+              </a14:hiddenFill>
+            </a:ext>
+          </a:extLst>
         </p:spPr>
       </p:pic>
     </p:spTree>
@@ -6288,7 +6320,7 @@
           <p:cNvPr id="2" name="Tytuł 1">
             <a:extLst>
               <a:ext uri="{FF2B5EF4-FFF2-40B4-BE49-F238E27FC236}">
-                <a16:creationId xmlns:a16="http://schemas.microsoft.com/office/drawing/2014/main" id="{410CA92D-2C73-A0B1-DB95-9CB1577C2503}"/>
+                <a16:creationId xmlns:a16="http://schemas.microsoft.com/office/drawing/2014/main" id="{F233687D-39E1-9792-7E38-E11EAA0425AE}"/>
               </a:ext>
             </a:extLst>
           </p:cNvPr>
@@ -6306,45 +6338,71 @@
           <a:p>
             <a:r>
               <a:rPr lang="pl-PL" dirty="0"/>
-              <a:t>Ekran porównywania ważności cech ofert</a:t>
-            </a:r>
+              <a:t>Ekran porównywania ofert względem cech – </a:t>
+            </a:r>
+            <a:r>
+              <a:rPr lang="pl-PL" sz="1800" dirty="0"/>
+              <a:t>dodane jest porównywanie per </a:t>
+            </a:r>
+            <a:r>
+              <a:rPr lang="pl-PL" sz="1800" dirty="0" err="1"/>
+              <a:t>expert</a:t>
+            </a:r>
+            <a:endParaRPr lang="pl-PL" dirty="0"/>
           </a:p>
         </p:txBody>
       </p:sp>
       <p:pic>
         <p:nvPicPr>
-          <p:cNvPr id="5" name="Obraz 4">
+          <p:cNvPr id="2050" name="Picture 2">
             <a:extLst>
               <a:ext uri="{FF2B5EF4-FFF2-40B4-BE49-F238E27FC236}">
-                <a16:creationId xmlns:a16="http://schemas.microsoft.com/office/drawing/2014/main" id="{58E13A6B-1472-EB0C-6293-53ABB140CC86}"/>
+                <a16:creationId xmlns:a16="http://schemas.microsoft.com/office/drawing/2014/main" id="{446D7CE0-73B2-ABE2-78C6-36E9D71DE38D}"/>
               </a:ext>
             </a:extLst>
           </p:cNvPr>
           <p:cNvPicPr>
-            <a:picLocks noChangeAspect="1"/>
+            <a:picLocks noChangeAspect="1" noChangeArrowheads="1"/>
           </p:cNvPicPr>
           <p:nvPr/>
         </p:nvPicPr>
         <p:blipFill>
-          <a:blip r:embed="rId2"/>
+          <a:blip r:embed="rId2">
+            <a:extLst>
+              <a:ext uri="{28A0092B-C50C-407E-A947-70E740481C1C}">
+                <a14:useLocalDpi xmlns:a14="http://schemas.microsoft.com/office/drawing/2010/main" val="0"/>
+              </a:ext>
+            </a:extLst>
+          </a:blip>
+          <a:srcRect/>
           <a:stretch>
             <a:fillRect/>
           </a:stretch>
         </p:blipFill>
-        <p:spPr>
+        <p:spPr bwMode="auto">
           <a:xfrm>
-            <a:off x="2880157" y="1853248"/>
-            <a:ext cx="6431686" cy="4858270"/>
+            <a:off x="3458309" y="2139780"/>
+            <a:ext cx="5275381" cy="4030787"/>
           </a:xfrm>
           <a:prstGeom prst="rect">
             <a:avLst/>
           </a:prstGeom>
+          <a:noFill/>
+          <a:extLst>
+            <a:ext uri="{909E8E84-426E-40DD-AFC4-6F175D3DCCD1}">
+              <a14:hiddenFill xmlns:a14="http://schemas.microsoft.com/office/drawing/2010/main">
+                <a:solidFill>
+                  <a:srgbClr val="FFFFFF"/>
+                </a:solidFill>
+              </a14:hiddenFill>
+            </a:ext>
+          </a:extLst>
         </p:spPr>
       </p:pic>
     </p:spTree>
     <p:extLst>
       <p:ext uri="{BB962C8B-B14F-4D97-AF65-F5344CB8AC3E}">
-        <p14:creationId xmlns:p14="http://schemas.microsoft.com/office/powerpoint/2010/main" val="4068655594"/>
+        <p14:creationId xmlns:p14="http://schemas.microsoft.com/office/powerpoint/2010/main" val="2000282395"/>
       </p:ext>
     </p:extLst>
   </p:cSld>
@@ -6392,217 +6450,68 @@
           <a:bodyPr/>
           <a:lstStyle/>
           <a:p>
+            <a:pPr algn="r"/>
             <a:r>
               <a:rPr lang="pl-PL" dirty="0"/>
-              <a:t>Ekran porównywania ofert względem cech</a:t>
-            </a:r>
+              <a:t>Ekran współczynników spójności – </a:t>
+            </a:r>
+            <a:r>
+              <a:rPr lang="pl-PL" sz="1800" dirty="0"/>
+              <a:t>dodane współczynniki per </a:t>
+            </a:r>
+            <a:r>
+              <a:rPr lang="pl-PL" sz="1800" dirty="0" err="1"/>
+              <a:t>expert</a:t>
+            </a:r>
+            <a:endParaRPr lang="pl-PL" dirty="0"/>
           </a:p>
         </p:txBody>
       </p:sp>
       <p:pic>
         <p:nvPicPr>
-          <p:cNvPr id="5" name="Obraz 4">
+          <p:cNvPr id="3074" name="Picture 2">
             <a:extLst>
               <a:ext uri="{FF2B5EF4-FFF2-40B4-BE49-F238E27FC236}">
-                <a16:creationId xmlns:a16="http://schemas.microsoft.com/office/drawing/2014/main" id="{54DFFA74-C939-D969-3888-BD677F7CAD5B}"/>
+                <a16:creationId xmlns:a16="http://schemas.microsoft.com/office/drawing/2014/main" id="{338E1646-C62B-57AE-6EF4-8C95EC4BD669}"/>
               </a:ext>
             </a:extLst>
           </p:cNvPr>
           <p:cNvPicPr>
-            <a:picLocks noChangeAspect="1"/>
+            <a:picLocks noChangeAspect="1" noChangeArrowheads="1"/>
           </p:cNvPicPr>
           <p:nvPr/>
         </p:nvPicPr>
         <p:blipFill>
-          <a:blip r:embed="rId2"/>
+          <a:blip r:embed="rId2">
+            <a:extLst>
+              <a:ext uri="{28A0092B-C50C-407E-A947-70E740481C1C}">
+                <a14:useLocalDpi xmlns:a14="http://schemas.microsoft.com/office/drawing/2010/main" val="0"/>
+              </a:ext>
+            </a:extLst>
+          </a:blip>
+          <a:srcRect/>
           <a:stretch>
             <a:fillRect/>
           </a:stretch>
         </p:blipFill>
-        <p:spPr>
+        <p:spPr bwMode="auto">
           <a:xfrm>
-            <a:off x="2851950" y="1853248"/>
-            <a:ext cx="6488099" cy="4889312"/>
+            <a:off x="3525567" y="2026292"/>
+            <a:ext cx="5140866" cy="3890861"/>
           </a:xfrm>
           <a:prstGeom prst="rect">
             <a:avLst/>
           </a:prstGeom>
-        </p:spPr>
-      </p:pic>
-    </p:spTree>
-    <p:extLst>
-      <p:ext uri="{BB962C8B-B14F-4D97-AF65-F5344CB8AC3E}">
-        <p14:creationId xmlns:p14="http://schemas.microsoft.com/office/powerpoint/2010/main" val="2000282395"/>
-      </p:ext>
-    </p:extLst>
-  </p:cSld>
-  <p:clrMapOvr>
-    <a:masterClrMapping/>
-  </p:clrMapOvr>
-</p:sld>
-</file>
-
-<file path=ppt/slides/slide5.xml><?xml version="1.0" encoding="utf-8"?>
-<p:sld xmlns:a="http://schemas.openxmlformats.org/drawingml/2006/main" xmlns:r="http://schemas.openxmlformats.org/officeDocument/2006/relationships" xmlns:p="http://schemas.openxmlformats.org/presentationml/2006/main">
-  <p:cSld>
-    <p:spTree>
-      <p:nvGrpSpPr>
-        <p:cNvPr id="1" name=""/>
-        <p:cNvGrpSpPr/>
-        <p:nvPr/>
-      </p:nvGrpSpPr>
-      <p:grpSpPr>
-        <a:xfrm>
-          <a:off x="0" y="0"/>
-          <a:ext cx="0" cy="0"/>
-          <a:chOff x="0" y="0"/>
-          <a:chExt cx="0" cy="0"/>
-        </a:xfrm>
-      </p:grpSpPr>
-      <p:sp>
-        <p:nvSpPr>
-          <p:cNvPr id="2" name="Tytuł 1">
-            <a:extLst>
-              <a:ext uri="{FF2B5EF4-FFF2-40B4-BE49-F238E27FC236}">
-                <a16:creationId xmlns:a16="http://schemas.microsoft.com/office/drawing/2014/main" id="{F233687D-39E1-9792-7E38-E11EAA0425AE}"/>
-              </a:ext>
-            </a:extLst>
-          </p:cNvPr>
-          <p:cNvSpPr>
-            <a:spLocks noGrp="1"/>
-          </p:cNvSpPr>
-          <p:nvPr>
-            <p:ph type="title"/>
-          </p:nvPr>
-        </p:nvSpPr>
-        <p:spPr/>
-        <p:txBody>
-          <a:bodyPr/>
-          <a:lstStyle/>
-          <a:p>
-            <a:r>
-              <a:rPr lang="pl-PL" dirty="0"/>
-              <a:t>Ekran wyników porównania</a:t>
-            </a:r>
-          </a:p>
-        </p:txBody>
-      </p:sp>
-      <p:pic>
-        <p:nvPicPr>
-          <p:cNvPr id="4" name="Obraz 3">
-            <a:extLst>
-              <a:ext uri="{FF2B5EF4-FFF2-40B4-BE49-F238E27FC236}">
-                <a16:creationId xmlns:a16="http://schemas.microsoft.com/office/drawing/2014/main" id="{FEC9E41A-ACEE-B3FB-52AC-1511280BDF66}"/>
-              </a:ext>
-            </a:extLst>
-          </p:cNvPr>
-          <p:cNvPicPr>
-            <a:picLocks noChangeAspect="1"/>
-          </p:cNvPicPr>
-          <p:nvPr/>
-        </p:nvPicPr>
-        <p:blipFill>
-          <a:blip r:embed="rId2"/>
-          <a:stretch>
-            <a:fillRect/>
-          </a:stretch>
-        </p:blipFill>
-        <p:spPr>
-          <a:xfrm>
-            <a:off x="2790363" y="1566400"/>
-            <a:ext cx="6611273" cy="5029902"/>
-          </a:xfrm>
-          <a:prstGeom prst="rect">
-            <a:avLst/>
-          </a:prstGeom>
-        </p:spPr>
-      </p:pic>
-    </p:spTree>
-    <p:extLst>
-      <p:ext uri="{BB962C8B-B14F-4D97-AF65-F5344CB8AC3E}">
-        <p14:creationId xmlns:p14="http://schemas.microsoft.com/office/powerpoint/2010/main" val="1925314651"/>
-      </p:ext>
-    </p:extLst>
-  </p:cSld>
-  <p:clrMapOvr>
-    <a:masterClrMapping/>
-  </p:clrMapOvr>
-</p:sld>
-</file>
-
-<file path=ppt/slides/slide6.xml><?xml version="1.0" encoding="utf-8"?>
-<p:sld xmlns:a="http://schemas.openxmlformats.org/drawingml/2006/main" xmlns:r="http://schemas.openxmlformats.org/officeDocument/2006/relationships" xmlns:p="http://schemas.openxmlformats.org/presentationml/2006/main">
-  <p:cSld>
-    <p:spTree>
-      <p:nvGrpSpPr>
-        <p:cNvPr id="1" name=""/>
-        <p:cNvGrpSpPr/>
-        <p:nvPr/>
-      </p:nvGrpSpPr>
-      <p:grpSpPr>
-        <a:xfrm>
-          <a:off x="0" y="0"/>
-          <a:ext cx="0" cy="0"/>
-          <a:chOff x="0" y="0"/>
-          <a:chExt cx="0" cy="0"/>
-        </a:xfrm>
-      </p:grpSpPr>
-      <p:sp>
-        <p:nvSpPr>
-          <p:cNvPr id="2" name="Tytuł 1">
-            <a:extLst>
-              <a:ext uri="{FF2B5EF4-FFF2-40B4-BE49-F238E27FC236}">
-                <a16:creationId xmlns:a16="http://schemas.microsoft.com/office/drawing/2014/main" id="{F233687D-39E1-9792-7E38-E11EAA0425AE}"/>
-              </a:ext>
-            </a:extLst>
-          </p:cNvPr>
-          <p:cNvSpPr>
-            <a:spLocks noGrp="1"/>
-          </p:cNvSpPr>
-          <p:nvPr>
-            <p:ph type="title"/>
-          </p:nvPr>
-        </p:nvSpPr>
-        <p:spPr/>
-        <p:txBody>
-          <a:bodyPr/>
-          <a:lstStyle/>
-          <a:p>
-            <a:r>
-              <a:rPr lang="pl-PL" dirty="0"/>
-              <a:t>Ekran współczynników spójności</a:t>
-            </a:r>
-          </a:p>
-        </p:txBody>
-      </p:sp>
-      <p:pic>
-        <p:nvPicPr>
-          <p:cNvPr id="5" name="Obraz 4">
-            <a:extLst>
-              <a:ext uri="{FF2B5EF4-FFF2-40B4-BE49-F238E27FC236}">
-                <a16:creationId xmlns:a16="http://schemas.microsoft.com/office/drawing/2014/main" id="{B06AF64B-8BBB-1233-DA02-4B20158B5DA3}"/>
-              </a:ext>
-            </a:extLst>
-          </p:cNvPr>
-          <p:cNvPicPr>
-            <a:picLocks noChangeAspect="1"/>
-          </p:cNvPicPr>
-          <p:nvPr/>
-        </p:nvPicPr>
-        <p:blipFill>
-          <a:blip r:embed="rId2"/>
-          <a:stretch>
-            <a:fillRect/>
-          </a:stretch>
-        </p:blipFill>
-        <p:spPr>
-          <a:xfrm>
-            <a:off x="2814179" y="1470643"/>
-            <a:ext cx="6563641" cy="4934639"/>
-          </a:xfrm>
-          <a:prstGeom prst="rect">
-            <a:avLst/>
-          </a:prstGeom>
+          <a:noFill/>
+          <a:extLst>
+            <a:ext uri="{909E8E84-426E-40DD-AFC4-6F175D3DCCD1}">
+              <a14:hiddenFill xmlns:a14="http://schemas.microsoft.com/office/drawing/2010/main">
+                <a:solidFill>
+                  <a:srgbClr val="FFFFFF"/>
+                </a:solidFill>
+              </a14:hiddenFill>
+            </a:ext>
+          </a:extLst>
         </p:spPr>
       </p:pic>
     </p:spTree>

</xml_diff>